<commit_message>
introduction to temperature started
</commit_message>
<xml_diff>
--- a/Business/uzleti terv.pptx
+++ b/Business/uzleti terv.pptx
@@ -292,7 +292,7 @@
           <a:p>
             <a:fld id="{96095F27-A16A-4F83-8F3C-4351DBF74D6F}" type="datetimeFigureOut">
               <a:rPr lang="en-US" smtClean="0"/>
-              <a:t>12/16/2020</a:t>
+              <a:t>12/30/2020</a:t>
             </a:fld>
             <a:endParaRPr lang="en-US"/>
           </a:p>
@@ -462,7 +462,7 @@
           <a:p>
             <a:fld id="{96095F27-A16A-4F83-8F3C-4351DBF74D6F}" type="datetimeFigureOut">
               <a:rPr lang="en-US" smtClean="0"/>
-              <a:t>12/16/2020</a:t>
+              <a:t>12/30/2020</a:t>
             </a:fld>
             <a:endParaRPr lang="en-US"/>
           </a:p>
@@ -642,7 +642,7 @@
           <a:p>
             <a:fld id="{96095F27-A16A-4F83-8F3C-4351DBF74D6F}" type="datetimeFigureOut">
               <a:rPr lang="en-US" smtClean="0"/>
-              <a:t>12/16/2020</a:t>
+              <a:t>12/30/2020</a:t>
             </a:fld>
             <a:endParaRPr lang="en-US"/>
           </a:p>
@@ -812,7 +812,7 @@
           <a:p>
             <a:fld id="{96095F27-A16A-4F83-8F3C-4351DBF74D6F}" type="datetimeFigureOut">
               <a:rPr lang="en-US" smtClean="0"/>
-              <a:t>12/16/2020</a:t>
+              <a:t>12/30/2020</a:t>
             </a:fld>
             <a:endParaRPr lang="en-US"/>
           </a:p>
@@ -1058,7 +1058,7 @@
           <a:p>
             <a:fld id="{96095F27-A16A-4F83-8F3C-4351DBF74D6F}" type="datetimeFigureOut">
               <a:rPr lang="en-US" smtClean="0"/>
-              <a:t>12/16/2020</a:t>
+              <a:t>12/30/2020</a:t>
             </a:fld>
             <a:endParaRPr lang="en-US"/>
           </a:p>
@@ -1290,7 +1290,7 @@
           <a:p>
             <a:fld id="{96095F27-A16A-4F83-8F3C-4351DBF74D6F}" type="datetimeFigureOut">
               <a:rPr lang="en-US" smtClean="0"/>
-              <a:t>12/16/2020</a:t>
+              <a:t>12/30/2020</a:t>
             </a:fld>
             <a:endParaRPr lang="en-US"/>
           </a:p>
@@ -1657,7 +1657,7 @@
           <a:p>
             <a:fld id="{96095F27-A16A-4F83-8F3C-4351DBF74D6F}" type="datetimeFigureOut">
               <a:rPr lang="en-US" smtClean="0"/>
-              <a:t>12/16/2020</a:t>
+              <a:t>12/30/2020</a:t>
             </a:fld>
             <a:endParaRPr lang="en-US"/>
           </a:p>
@@ -1775,7 +1775,7 @@
           <a:p>
             <a:fld id="{96095F27-A16A-4F83-8F3C-4351DBF74D6F}" type="datetimeFigureOut">
               <a:rPr lang="en-US" smtClean="0"/>
-              <a:t>12/16/2020</a:t>
+              <a:t>12/30/2020</a:t>
             </a:fld>
             <a:endParaRPr lang="en-US"/>
           </a:p>
@@ -1870,7 +1870,7 @@
           <a:p>
             <a:fld id="{96095F27-A16A-4F83-8F3C-4351DBF74D6F}" type="datetimeFigureOut">
               <a:rPr lang="en-US" smtClean="0"/>
-              <a:t>12/16/2020</a:t>
+              <a:t>12/30/2020</a:t>
             </a:fld>
             <a:endParaRPr lang="en-US"/>
           </a:p>
@@ -2147,7 +2147,7 @@
           <a:p>
             <a:fld id="{96095F27-A16A-4F83-8F3C-4351DBF74D6F}" type="datetimeFigureOut">
               <a:rPr lang="en-US" smtClean="0"/>
-              <a:t>12/16/2020</a:t>
+              <a:t>12/30/2020</a:t>
             </a:fld>
             <a:endParaRPr lang="en-US"/>
           </a:p>
@@ -2400,7 +2400,7 @@
           <a:p>
             <a:fld id="{96095F27-A16A-4F83-8F3C-4351DBF74D6F}" type="datetimeFigureOut">
               <a:rPr lang="en-US" smtClean="0"/>
-              <a:t>12/16/2020</a:t>
+              <a:t>12/30/2020</a:t>
             </a:fld>
             <a:endParaRPr lang="en-US"/>
           </a:p>
@@ -2613,7 +2613,7 @@
           <a:p>
             <a:fld id="{96095F27-A16A-4F83-8F3C-4351DBF74D6F}" type="datetimeFigureOut">
               <a:rPr lang="en-US" smtClean="0"/>
-              <a:t>12/16/2020</a:t>
+              <a:t>12/30/2020</a:t>
             </a:fld>
             <a:endParaRPr lang="en-US"/>
           </a:p>
@@ -3125,6 +3125,13 @@
   <p:clrMapOvr>
     <a:masterClrMapping/>
   </p:clrMapOvr>
+  <p:timing>
+    <p:tnLst>
+      <p:par>
+        <p:cTn id="1" dur="indefinite" restart="never" nodeType="tmRoot"/>
+      </p:par>
+    </p:tnLst>
+  </p:timing>
 </p:sld>
 </file>
 
@@ -3224,6 +3231,13 @@
   <p:clrMapOvr>
     <a:masterClrMapping/>
   </p:clrMapOvr>
+  <p:timing>
+    <p:tnLst>
+      <p:par>
+        <p:cTn id="1" dur="indefinite" restart="never" nodeType="tmRoot"/>
+      </p:par>
+    </p:tnLst>
+  </p:timing>
 </p:sld>
 </file>
 
@@ -3548,11 +3562,7 @@
             </a:r>
             <a:r>
               <a:rPr lang="en-US" sz="4400" dirty="0" smtClean="0"/>
-              <a:t> </a:t>
-            </a:r>
-            <a:r>
-              <a:rPr lang="en-US" sz="4400" dirty="0" smtClean="0"/>
-              <a:t>Academy</a:t>
+              <a:t> Academy</a:t>
             </a:r>
             <a:endParaRPr lang="en-US" sz="4400" dirty="0"/>
           </a:p>
@@ -3767,11 +3777,7 @@
             </a:r>
             <a:r>
               <a:rPr lang="en-US" b="1" dirty="0" smtClean="0"/>
-              <a:t> </a:t>
-            </a:r>
-            <a:r>
-              <a:rPr lang="en-US" b="1" dirty="0" smtClean="0"/>
-              <a:t>+ </a:t>
+              <a:t> + </a:t>
             </a:r>
             <a:r>
               <a:rPr lang="en-US" b="1" dirty="0" err="1" smtClean="0"/>
@@ -4030,11 +4036,7 @@
           <a:p>
             <a:r>
               <a:rPr lang="en-US" dirty="0" smtClean="0"/>
-              <a:t>Start-up </a:t>
-            </a:r>
-            <a:r>
-              <a:rPr lang="en-US" dirty="0" smtClean="0"/>
-              <a:t>t</a:t>
+              <a:t>Start-up t</a:t>
             </a:r>
             <a:r>
               <a:rPr lang="hu-HU" dirty="0" smtClean="0"/>
@@ -4381,6 +4383,13 @@
   <p:clrMapOvr>
     <a:masterClrMapping/>
   </p:clrMapOvr>
+  <p:timing>
+    <p:tnLst>
+      <p:par>
+        <p:cTn id="1" dur="indefinite" restart="never" nodeType="tmRoot"/>
+      </p:par>
+    </p:tnLst>
+  </p:timing>
 </p:sld>
 </file>
 
@@ -4458,6 +4467,13 @@
   <p:clrMapOvr>
     <a:masterClrMapping/>
   </p:clrMapOvr>
+  <p:timing>
+    <p:tnLst>
+      <p:par>
+        <p:cTn id="1" dur="indefinite" restart="never" nodeType="tmRoot"/>
+      </p:par>
+    </p:tnLst>
+  </p:timing>
 </p:sld>
 </file>
 
@@ -4946,6 +4962,13 @@
   <p:clrMapOvr>
     <a:masterClrMapping/>
   </p:clrMapOvr>
+  <p:timing>
+    <p:tnLst>
+      <p:par>
+        <p:cTn id="1" dur="indefinite" restart="never" nodeType="tmRoot"/>
+      </p:par>
+    </p:tnLst>
+  </p:timing>
 </p:sld>
 </file>
 
@@ -5966,6 +5989,13 @@
   <p:clrMapOvr>
     <a:masterClrMapping/>
   </p:clrMapOvr>
+  <p:timing>
+    <p:tnLst>
+      <p:par>
+        <p:cTn id="1" dur="indefinite" restart="never" nodeType="tmRoot"/>
+      </p:par>
+    </p:tnLst>
+  </p:timing>
 </p:sld>
 </file>
 
@@ -6064,6 +6094,13 @@
   <p:clrMapOvr>
     <a:masterClrMapping/>
   </p:clrMapOvr>
+  <p:timing>
+    <p:tnLst>
+      <p:par>
+        <p:cTn id="1" dur="indefinite" restart="never" nodeType="tmRoot"/>
+      </p:par>
+    </p:tnLst>
+  </p:timing>
 </p:sld>
 </file>
 
@@ -6168,6 +6205,13 @@
   <p:clrMapOvr>
     <a:masterClrMapping/>
   </p:clrMapOvr>
+  <p:timing>
+    <p:tnLst>
+      <p:par>
+        <p:cTn id="1" dur="indefinite" restart="never" nodeType="tmRoot"/>
+      </p:par>
+    </p:tnLst>
+  </p:timing>
 </p:sld>
 </file>
 
@@ -6258,6 +6302,13 @@
   <p:clrMapOvr>
     <a:masterClrMapping/>
   </p:clrMapOvr>
+  <p:timing>
+    <p:tnLst>
+      <p:par>
+        <p:cTn id="1" dur="indefinite" restart="never" nodeType="tmRoot"/>
+      </p:par>
+    </p:tnLst>
+  </p:timing>
 </p:sld>
 </file>
 
@@ -6362,6 +6413,13 @@
   <p:clrMapOvr>
     <a:masterClrMapping/>
   </p:clrMapOvr>
+  <p:timing>
+    <p:tnLst>
+      <p:par>
+        <p:cTn id="1" dur="indefinite" restart="never" nodeType="tmRoot"/>
+      </p:par>
+    </p:tnLst>
+  </p:timing>
 </p:sld>
 </file>
 
@@ -6855,6 +6913,13 @@
   <p:clrMapOvr>
     <a:masterClrMapping/>
   </p:clrMapOvr>
+  <p:timing>
+    <p:tnLst>
+      <p:par>
+        <p:cTn id="1" dur="indefinite" restart="never" nodeType="tmRoot"/>
+      </p:par>
+    </p:tnLst>
+  </p:timing>
 </p:sld>
 </file>
 
@@ -6995,6 +7060,13 @@
   <p:clrMapOvr>
     <a:masterClrMapping/>
   </p:clrMapOvr>
+  <p:timing>
+    <p:tnLst>
+      <p:par>
+        <p:cTn id="1" dur="indefinite" restart="never" nodeType="tmRoot"/>
+      </p:par>
+    </p:tnLst>
+  </p:timing>
 </p:sld>
 </file>
 
@@ -7250,6 +7322,13 @@
   <p:clrMapOvr>
     <a:masterClrMapping/>
   </p:clrMapOvr>
+  <p:timing>
+    <p:tnLst>
+      <p:par>
+        <p:cTn id="1" dur="indefinite" restart="never" nodeType="tmRoot"/>
+      </p:par>
+    </p:tnLst>
+  </p:timing>
 </p:sld>
 </file>
 
@@ -7533,6 +7612,13 @@
   <p:clrMapOvr>
     <a:masterClrMapping/>
   </p:clrMapOvr>
+  <p:timing>
+    <p:tnLst>
+      <p:par>
+        <p:cTn id="1" dur="indefinite" restart="never" nodeType="tmRoot"/>
+      </p:par>
+    </p:tnLst>
+  </p:timing>
 </p:sld>
 </file>
 
@@ -8014,7 +8100,165 @@
   <p:timing>
     <p:tnLst>
       <p:par>
-        <p:cTn id="1" dur="indefinite" restart="never" nodeType="tmRoot"/>
+        <p:cTn id="1" dur="indefinite" restart="never" nodeType="tmRoot">
+          <p:childTnLst>
+            <p:seq concurrent="1" nextAc="seek">
+              <p:cTn id="2" dur="indefinite" nodeType="mainSeq">
+                <p:childTnLst>
+                  <p:par>
+                    <p:cTn id="3" fill="hold">
+                      <p:stCondLst>
+                        <p:cond delay="indefinite"/>
+                      </p:stCondLst>
+                      <p:childTnLst>
+                        <p:par>
+                          <p:cTn id="4" fill="hold">
+                            <p:stCondLst>
+                              <p:cond delay="0"/>
+                            </p:stCondLst>
+                            <p:childTnLst>
+                              <p:par>
+                                <p:cTn id="5" presetID="1" presetClass="entr" presetSubtype="0" fill="hold" nodeType="clickEffect">
+                                  <p:stCondLst>
+                                    <p:cond delay="0"/>
+                                  </p:stCondLst>
+                                  <p:childTnLst>
+                                    <p:set>
+                                      <p:cBhvr>
+                                        <p:cTn id="6" dur="1" fill="hold">
+                                          <p:stCondLst>
+                                            <p:cond delay="0"/>
+                                          </p:stCondLst>
+                                        </p:cTn>
+                                        <p:tgtEl>
+                                          <p:spTgt spid="11"/>
+                                        </p:tgtEl>
+                                        <p:attrNameLst>
+                                          <p:attrName>style.visibility</p:attrName>
+                                        </p:attrNameLst>
+                                      </p:cBhvr>
+                                      <p:to>
+                                        <p:strVal val="visible"/>
+                                      </p:to>
+                                    </p:set>
+                                  </p:childTnLst>
+                                </p:cTn>
+                              </p:par>
+                            </p:childTnLst>
+                          </p:cTn>
+                        </p:par>
+                      </p:childTnLst>
+                    </p:cTn>
+                  </p:par>
+                  <p:par>
+                    <p:cTn id="7" fill="hold">
+                      <p:stCondLst>
+                        <p:cond delay="indefinite"/>
+                      </p:stCondLst>
+                      <p:childTnLst>
+                        <p:par>
+                          <p:cTn id="8" fill="hold">
+                            <p:stCondLst>
+                              <p:cond delay="0"/>
+                            </p:stCondLst>
+                            <p:childTnLst>
+                              <p:par>
+                                <p:cTn id="9" presetID="1" presetClass="entr" presetSubtype="0" fill="hold" nodeType="clickEffect">
+                                  <p:stCondLst>
+                                    <p:cond delay="0"/>
+                                  </p:stCondLst>
+                                  <p:childTnLst>
+                                    <p:set>
+                                      <p:cBhvr>
+                                        <p:cTn id="10" dur="1" fill="hold">
+                                          <p:stCondLst>
+                                            <p:cond delay="0"/>
+                                          </p:stCondLst>
+                                        </p:cTn>
+                                        <p:tgtEl>
+                                          <p:spTgt spid="13"/>
+                                        </p:tgtEl>
+                                        <p:attrNameLst>
+                                          <p:attrName>style.visibility</p:attrName>
+                                        </p:attrNameLst>
+                                      </p:cBhvr>
+                                      <p:to>
+                                        <p:strVal val="visible"/>
+                                      </p:to>
+                                    </p:set>
+                                  </p:childTnLst>
+                                </p:cTn>
+                              </p:par>
+                            </p:childTnLst>
+                          </p:cTn>
+                        </p:par>
+                      </p:childTnLst>
+                    </p:cTn>
+                  </p:par>
+                  <p:par>
+                    <p:cTn id="11" fill="hold">
+                      <p:stCondLst>
+                        <p:cond delay="indefinite"/>
+                      </p:stCondLst>
+                      <p:childTnLst>
+                        <p:par>
+                          <p:cTn id="12" fill="hold">
+                            <p:stCondLst>
+                              <p:cond delay="0"/>
+                            </p:stCondLst>
+                            <p:childTnLst>
+                              <p:par>
+                                <p:cTn id="13" presetID="1" presetClass="entr" presetSubtype="0" fill="hold" nodeType="clickEffect">
+                                  <p:stCondLst>
+                                    <p:cond delay="0"/>
+                                  </p:stCondLst>
+                                  <p:childTnLst>
+                                    <p:set>
+                                      <p:cBhvr>
+                                        <p:cTn id="14" dur="1" fill="hold">
+                                          <p:stCondLst>
+                                            <p:cond delay="0"/>
+                                          </p:stCondLst>
+                                        </p:cTn>
+                                        <p:tgtEl>
+                                          <p:spTgt spid="15"/>
+                                        </p:tgtEl>
+                                        <p:attrNameLst>
+                                          <p:attrName>style.visibility</p:attrName>
+                                        </p:attrNameLst>
+                                      </p:cBhvr>
+                                      <p:to>
+                                        <p:strVal val="visible"/>
+                                      </p:to>
+                                    </p:set>
+                                  </p:childTnLst>
+                                </p:cTn>
+                              </p:par>
+                            </p:childTnLst>
+                          </p:cTn>
+                        </p:par>
+                      </p:childTnLst>
+                    </p:cTn>
+                  </p:par>
+                </p:childTnLst>
+              </p:cTn>
+              <p:prevCondLst>
+                <p:cond evt="onPrev" delay="0">
+                  <p:tgtEl>
+                    <p:sldTgt/>
+                  </p:tgtEl>
+                </p:cond>
+              </p:prevCondLst>
+              <p:nextCondLst>
+                <p:cond evt="onNext" delay="0">
+                  <p:tgtEl>
+                    <p:sldTgt/>
+                  </p:tgtEl>
+                </p:cond>
+              </p:nextCondLst>
+            </p:seq>
+          </p:childTnLst>
+        </p:cTn>
       </p:par>
     </p:tnLst>
   </p:timing>
@@ -8209,6 +8453,13 @@
   <p:clrMapOvr>
     <a:masterClrMapping/>
   </p:clrMapOvr>
+  <p:timing>
+    <p:tnLst>
+      <p:par>
+        <p:cTn id="1" dur="indefinite" restart="never" nodeType="tmRoot"/>
+      </p:par>
+    </p:tnLst>
+  </p:timing>
 </p:sld>
 </file>
 
@@ -8322,6 +8573,13 @@
   <p:clrMapOvr>
     <a:masterClrMapping/>
   </p:clrMapOvr>
+  <p:timing>
+    <p:tnLst>
+      <p:par>
+        <p:cTn id="1" dur="indefinite" restart="never" nodeType="tmRoot"/>
+      </p:par>
+    </p:tnLst>
+  </p:timing>
 </p:sld>
 </file>
 
@@ -8548,6 +8806,13 @@
   <p:clrMapOvr>
     <a:masterClrMapping/>
   </p:clrMapOvr>
+  <p:timing>
+    <p:tnLst>
+      <p:par>
+        <p:cTn id="1" dur="indefinite" restart="never" nodeType="tmRoot"/>
+      </p:par>
+    </p:tnLst>
+  </p:timing>
 </p:sld>
 </file>
 
@@ -8671,6 +8936,13 @@
   <p:clrMapOvr>
     <a:masterClrMapping/>
   </p:clrMapOvr>
+  <p:timing>
+    <p:tnLst>
+      <p:par>
+        <p:cTn id="1" dur="indefinite" restart="never" nodeType="tmRoot"/>
+      </p:par>
+    </p:tnLst>
+  </p:timing>
 </p:sld>
 </file>
 

</xml_diff>